<commit_message>
Changes to W6 after teaching and syllabus due to announcements for HW2.
</commit_message>
<xml_diff>
--- a/W6/1. W6S1 final/W6S1.pptx
+++ b/W6/1. W6S1 final/W6S1.pptx
@@ -270,6 +270,14 @@
 </p:presentation>
 </file>
 
+<file path=ppt/revisionInfo.xml><?xml version="1.0" encoding="utf-8"?>
+<p1510:revInfo xmlns:a="http://schemas.openxmlformats.org/drawingml/2006/main" xmlns:r="http://schemas.openxmlformats.org/officeDocument/2006/relationships" xmlns:p1510="http://schemas.microsoft.com/office/powerpoint/2015/10/main">
+  <p1510:revLst>
+    <p1510:client id="{413746AE-83C4-4944-A8AA-71CCD5B216E9}" v="14" dt="2024-02-26T04:55:44.435"/>
+  </p1510:revLst>
+</p1510:revInfo>
+</file>
+
 <file path=ppt/changesInfos/changesInfo1.xml><?xml version="1.0" encoding="utf-8"?>
 <pc:chgInfo xmlns:a="http://schemas.openxmlformats.org/drawingml/2006/main" xmlns:r="http://schemas.openxmlformats.org/officeDocument/2006/relationships" xmlns:ac="http://schemas.microsoft.com/office/drawing/2013/main/command" xmlns:pc="http://schemas.microsoft.com/office/powerpoint/2013/main/command">
   <pc:docChgLst>
@@ -5562,11 +5570,90 @@
   </pc:docChgLst>
   <pc:docChgLst>
     <pc:chgData name="Matthieu De Mari" userId="dfb708c9-d8dc-439f-9a3b-c772bf4a311c" providerId="ADAL" clId="{413746AE-83C4-4944-A8AA-71CCD5B216E9}"/>
-    <pc:docChg chg="custSel delSld modSld modSection">
-      <pc:chgData name="Matthieu De Mari" userId="dfb708c9-d8dc-439f-9a3b-c772bf4a311c" providerId="ADAL" clId="{413746AE-83C4-4944-A8AA-71CCD5B216E9}" dt="2024-02-09T00:48:19.214" v="246" actId="20577"/>
+    <pc:docChg chg="undo custSel addSld delSld modSld modSection">
+      <pc:chgData name="Matthieu De Mari" userId="dfb708c9-d8dc-439f-9a3b-c772bf4a311c" providerId="ADAL" clId="{413746AE-83C4-4944-A8AA-71CCD5B216E9}" dt="2024-02-26T05:10:44.147" v="330" actId="47"/>
       <pc:docMkLst>
         <pc:docMk/>
       </pc:docMkLst>
+      <pc:sldChg chg="addSp delSp mod">
+        <pc:chgData name="Matthieu De Mari" userId="dfb708c9-d8dc-439f-9a3b-c772bf4a311c" providerId="ADAL" clId="{413746AE-83C4-4944-A8AA-71CCD5B216E9}" dt="2024-02-26T03:57:35.865" v="264" actId="9405"/>
+        <pc:sldMkLst>
+          <pc:docMk/>
+          <pc:sldMk cId="1040156172" sldId="377"/>
+        </pc:sldMkLst>
+        <pc:inkChg chg="add del">
+          <ac:chgData name="Matthieu De Mari" userId="dfb708c9-d8dc-439f-9a3b-c772bf4a311c" providerId="ADAL" clId="{413746AE-83C4-4944-A8AA-71CCD5B216E9}" dt="2024-02-26T03:52:08.582" v="256" actId="9405"/>
+          <ac:inkMkLst>
+            <pc:docMk/>
+            <pc:sldMk cId="1040156172" sldId="377"/>
+            <ac:inkMk id="5" creationId="{AC003B5C-D077-27CC-A91E-7DC5BE03FC21}"/>
+          </ac:inkMkLst>
+        </pc:inkChg>
+        <pc:inkChg chg="add del">
+          <ac:chgData name="Matthieu De Mari" userId="dfb708c9-d8dc-439f-9a3b-c772bf4a311c" providerId="ADAL" clId="{413746AE-83C4-4944-A8AA-71CCD5B216E9}" dt="2024-02-26T03:51:51.839" v="251" actId="9405"/>
+          <ac:inkMkLst>
+            <pc:docMk/>
+            <pc:sldMk cId="1040156172" sldId="377"/>
+            <ac:inkMk id="6" creationId="{A0D4A250-40B7-B063-6383-61B77B34D0DE}"/>
+          </ac:inkMkLst>
+        </pc:inkChg>
+        <pc:inkChg chg="add del">
+          <ac:chgData name="Matthieu De Mari" userId="dfb708c9-d8dc-439f-9a3b-c772bf4a311c" providerId="ADAL" clId="{413746AE-83C4-4944-A8AA-71CCD5B216E9}" dt="2024-02-26T03:51:51.662" v="250" actId="9405"/>
+          <ac:inkMkLst>
+            <pc:docMk/>
+            <pc:sldMk cId="1040156172" sldId="377"/>
+            <ac:inkMk id="7" creationId="{00230A73-9D00-4AFE-0B5A-266E95894648}"/>
+          </ac:inkMkLst>
+        </pc:inkChg>
+        <pc:inkChg chg="add del">
+          <ac:chgData name="Matthieu De Mari" userId="dfb708c9-d8dc-439f-9a3b-c772bf4a311c" providerId="ADAL" clId="{413746AE-83C4-4944-A8AA-71CCD5B216E9}" dt="2024-02-26T03:51:54.675" v="253" actId="9405"/>
+          <ac:inkMkLst>
+            <pc:docMk/>
+            <pc:sldMk cId="1040156172" sldId="377"/>
+            <ac:inkMk id="8" creationId="{AFBC55EA-5E4A-90BA-41E3-CC6216033DAB}"/>
+          </ac:inkMkLst>
+        </pc:inkChg>
+        <pc:inkChg chg="add del">
+          <ac:chgData name="Matthieu De Mari" userId="dfb708c9-d8dc-439f-9a3b-c772bf4a311c" providerId="ADAL" clId="{413746AE-83C4-4944-A8AA-71CCD5B216E9}" dt="2024-02-26T03:52:07.931" v="255" actId="9405"/>
+          <ac:inkMkLst>
+            <pc:docMk/>
+            <pc:sldMk cId="1040156172" sldId="377"/>
+            <ac:inkMk id="9" creationId="{792E3160-87B6-38E1-AF48-0A9A7DC025A5}"/>
+          </ac:inkMkLst>
+        </pc:inkChg>
+        <pc:inkChg chg="add del">
+          <ac:chgData name="Matthieu De Mari" userId="dfb708c9-d8dc-439f-9a3b-c772bf4a311c" providerId="ADAL" clId="{413746AE-83C4-4944-A8AA-71CCD5B216E9}" dt="2024-02-26T03:54:15.903" v="258" actId="9405"/>
+          <ac:inkMkLst>
+            <pc:docMk/>
+            <pc:sldMk cId="1040156172" sldId="377"/>
+            <ac:inkMk id="10" creationId="{BBB25F3C-CEC9-4460-E165-0E5769E54272}"/>
+          </ac:inkMkLst>
+        </pc:inkChg>
+        <pc:inkChg chg="add del">
+          <ac:chgData name="Matthieu De Mari" userId="dfb708c9-d8dc-439f-9a3b-c772bf4a311c" providerId="ADAL" clId="{413746AE-83C4-4944-A8AA-71CCD5B216E9}" dt="2024-02-26T03:54:41.668" v="260" actId="9405"/>
+          <ac:inkMkLst>
+            <pc:docMk/>
+            <pc:sldMk cId="1040156172" sldId="377"/>
+            <ac:inkMk id="11" creationId="{2AE5F956-B41D-B6B0-F347-AE937399BB2B}"/>
+          </ac:inkMkLst>
+        </pc:inkChg>
+        <pc:inkChg chg="add del">
+          <ac:chgData name="Matthieu De Mari" userId="dfb708c9-d8dc-439f-9a3b-c772bf4a311c" providerId="ADAL" clId="{413746AE-83C4-4944-A8AA-71CCD5B216E9}" dt="2024-02-26T03:57:23.487" v="262" actId="9405"/>
+          <ac:inkMkLst>
+            <pc:docMk/>
+            <pc:sldMk cId="1040156172" sldId="377"/>
+            <ac:inkMk id="12" creationId="{6776AD1E-35A9-1BC1-2658-78A58F28D23B}"/>
+          </ac:inkMkLst>
+        </pc:inkChg>
+        <pc:inkChg chg="add del">
+          <ac:chgData name="Matthieu De Mari" userId="dfb708c9-d8dc-439f-9a3b-c772bf4a311c" providerId="ADAL" clId="{413746AE-83C4-4944-A8AA-71CCD5B216E9}" dt="2024-02-26T03:57:35.865" v="264" actId="9405"/>
+          <ac:inkMkLst>
+            <pc:docMk/>
+            <pc:sldMk cId="1040156172" sldId="377"/>
+            <ac:inkMk id="13" creationId="{DA055576-E807-5F35-B75C-C8EC91BDE103}"/>
+          </ac:inkMkLst>
+        </pc:inkChg>
+      </pc:sldChg>
       <pc:sldChg chg="del">
         <pc:chgData name="Matthieu De Mari" userId="dfb708c9-d8dc-439f-9a3b-c772bf4a311c" providerId="ADAL" clId="{413746AE-83C4-4944-A8AA-71CCD5B216E9}" dt="2024-02-09T00:36:16.163" v="0" actId="47"/>
         <pc:sldMkLst>
@@ -5655,6 +5742,549 @@
             <ac:spMk id="3" creationId="{C27E85C4-C37D-BCBC-37B4-67BAAE68237E}"/>
           </ac:spMkLst>
         </pc:spChg>
+      </pc:sldChg>
+      <pc:sldChg chg="addSp delSp modSp new del mod">
+        <pc:chgData name="Matthieu De Mari" userId="dfb708c9-d8dc-439f-9a3b-c772bf4a311c" providerId="ADAL" clId="{413746AE-83C4-4944-A8AA-71CCD5B216E9}" dt="2024-02-26T05:10:44.147" v="330" actId="47"/>
+        <pc:sldMkLst>
+          <pc:docMk/>
+          <pc:sldMk cId="2185147656" sldId="671"/>
+        </pc:sldMkLst>
+        <pc:spChg chg="del">
+          <ac:chgData name="Matthieu De Mari" userId="dfb708c9-d8dc-439f-9a3b-c772bf4a311c" providerId="ADAL" clId="{413746AE-83C4-4944-A8AA-71CCD5B216E9}" dt="2024-02-26T04:47:59.859" v="266" actId="478"/>
+          <ac:spMkLst>
+            <pc:docMk/>
+            <pc:sldMk cId="2185147656" sldId="671"/>
+            <ac:spMk id="2" creationId="{54195741-B7FF-89CD-4852-D526C5A0562F}"/>
+          </ac:spMkLst>
+        </pc:spChg>
+        <pc:spChg chg="del">
+          <ac:chgData name="Matthieu De Mari" userId="dfb708c9-d8dc-439f-9a3b-c772bf4a311c" providerId="ADAL" clId="{413746AE-83C4-4944-A8AA-71CCD5B216E9}" dt="2024-02-26T04:48:00.894" v="267" actId="478"/>
+          <ac:spMkLst>
+            <pc:docMk/>
+            <pc:sldMk cId="2185147656" sldId="671"/>
+            <ac:spMk id="3" creationId="{8DA054E8-766C-710C-4593-81B90E24A486}"/>
+          </ac:spMkLst>
+        </pc:spChg>
+        <pc:grpChg chg="del mod">
+          <ac:chgData name="Matthieu De Mari" userId="dfb708c9-d8dc-439f-9a3b-c772bf4a311c" providerId="ADAL" clId="{413746AE-83C4-4944-A8AA-71CCD5B216E9}" dt="2024-02-26T04:55:36.030" v="325"/>
+          <ac:grpSpMkLst>
+            <pc:docMk/>
+            <pc:sldMk cId="2185147656" sldId="671"/>
+            <ac:grpSpMk id="9" creationId="{874E1949-CC83-D9A5-4B94-F2798F245338}"/>
+          </ac:grpSpMkLst>
+        </pc:grpChg>
+        <pc:grpChg chg="del mod">
+          <ac:chgData name="Matthieu De Mari" userId="dfb708c9-d8dc-439f-9a3b-c772bf4a311c" providerId="ADAL" clId="{413746AE-83C4-4944-A8AA-71CCD5B216E9}" dt="2024-02-26T04:55:36.030" v="325"/>
+          <ac:grpSpMkLst>
+            <pc:docMk/>
+            <pc:sldMk cId="2185147656" sldId="671"/>
+            <ac:grpSpMk id="15" creationId="{80714C98-B5BC-553D-7652-6F24298D50ED}"/>
+          </ac:grpSpMkLst>
+        </pc:grpChg>
+        <pc:grpChg chg="del mod">
+          <ac:chgData name="Matthieu De Mari" userId="dfb708c9-d8dc-439f-9a3b-c772bf4a311c" providerId="ADAL" clId="{413746AE-83C4-4944-A8AA-71CCD5B216E9}" dt="2024-02-26T04:55:36.030" v="325"/>
+          <ac:grpSpMkLst>
+            <pc:docMk/>
+            <pc:sldMk cId="2185147656" sldId="671"/>
+            <ac:grpSpMk id="20" creationId="{8E98DA23-31A0-E1BF-DD70-E267B6F41164}"/>
+          </ac:grpSpMkLst>
+        </pc:grpChg>
+        <pc:grpChg chg="del mod">
+          <ac:chgData name="Matthieu De Mari" userId="dfb708c9-d8dc-439f-9a3b-c772bf4a311c" providerId="ADAL" clId="{413746AE-83C4-4944-A8AA-71CCD5B216E9}" dt="2024-02-26T04:55:36.030" v="325"/>
+          <ac:grpSpMkLst>
+            <pc:docMk/>
+            <pc:sldMk cId="2185147656" sldId="671"/>
+            <ac:grpSpMk id="21" creationId="{2AAB4C60-AFA1-78C0-50ED-DCB8D840A8A0}"/>
+          </ac:grpSpMkLst>
+        </pc:grpChg>
+        <pc:grpChg chg="del mod">
+          <ac:chgData name="Matthieu De Mari" userId="dfb708c9-d8dc-439f-9a3b-c772bf4a311c" providerId="ADAL" clId="{413746AE-83C4-4944-A8AA-71CCD5B216E9}" dt="2024-02-26T04:55:13.402" v="296"/>
+          <ac:grpSpMkLst>
+            <pc:docMk/>
+            <pc:sldMk cId="2185147656" sldId="671"/>
+            <ac:grpSpMk id="26" creationId="{059563CD-E784-54E5-7A3B-91E5002B9853}"/>
+          </ac:grpSpMkLst>
+        </pc:grpChg>
+        <pc:grpChg chg="del mod">
+          <ac:chgData name="Matthieu De Mari" userId="dfb708c9-d8dc-439f-9a3b-c772bf4a311c" providerId="ADAL" clId="{413746AE-83C4-4944-A8AA-71CCD5B216E9}" dt="2024-02-26T04:55:36.030" v="325"/>
+          <ac:grpSpMkLst>
+            <pc:docMk/>
+            <pc:sldMk cId="2185147656" sldId="671"/>
+            <ac:grpSpMk id="32" creationId="{45F298F0-F594-E70F-4183-B929D02789C1}"/>
+          </ac:grpSpMkLst>
+        </pc:grpChg>
+        <pc:grpChg chg="del mod">
+          <ac:chgData name="Matthieu De Mari" userId="dfb708c9-d8dc-439f-9a3b-c772bf4a311c" providerId="ADAL" clId="{413746AE-83C4-4944-A8AA-71CCD5B216E9}" dt="2024-02-26T04:55:36.030" v="325"/>
+          <ac:grpSpMkLst>
+            <pc:docMk/>
+            <pc:sldMk cId="2185147656" sldId="671"/>
+            <ac:grpSpMk id="36" creationId="{ACEFBC8C-4AB3-2D75-1A27-36A524D05BEA}"/>
+          </ac:grpSpMkLst>
+        </pc:grpChg>
+        <pc:grpChg chg="del mod">
+          <ac:chgData name="Matthieu De Mari" userId="dfb708c9-d8dc-439f-9a3b-c772bf4a311c" providerId="ADAL" clId="{413746AE-83C4-4944-A8AA-71CCD5B216E9}" dt="2024-02-26T04:55:36.030" v="325"/>
+          <ac:grpSpMkLst>
+            <pc:docMk/>
+            <pc:sldMk cId="2185147656" sldId="671"/>
+            <ac:grpSpMk id="45" creationId="{246AE3CC-B728-43AB-F594-AFE681270BBB}"/>
+          </ac:grpSpMkLst>
+        </pc:grpChg>
+        <pc:grpChg chg="del mod">
+          <ac:chgData name="Matthieu De Mari" userId="dfb708c9-d8dc-439f-9a3b-c772bf4a311c" providerId="ADAL" clId="{413746AE-83C4-4944-A8AA-71CCD5B216E9}" dt="2024-02-26T04:55:36.030" v="325"/>
+          <ac:grpSpMkLst>
+            <pc:docMk/>
+            <pc:sldMk cId="2185147656" sldId="671"/>
+            <ac:grpSpMk id="46" creationId="{513F063E-A259-A2DB-8072-19BD7E599247}"/>
+          </ac:grpSpMkLst>
+        </pc:grpChg>
+        <pc:grpChg chg="del mod">
+          <ac:chgData name="Matthieu De Mari" userId="dfb708c9-d8dc-439f-9a3b-c772bf4a311c" providerId="ADAL" clId="{413746AE-83C4-4944-A8AA-71CCD5B216E9}" dt="2024-02-26T04:55:27.958" v="322"/>
+          <ac:grpSpMkLst>
+            <pc:docMk/>
+            <pc:sldMk cId="2185147656" sldId="671"/>
+            <ac:grpSpMk id="49" creationId="{9665875D-0C1A-6391-C5A7-052FE3B54713}"/>
+          </ac:grpSpMkLst>
+        </pc:grpChg>
+        <pc:grpChg chg="del mod">
+          <ac:chgData name="Matthieu De Mari" userId="dfb708c9-d8dc-439f-9a3b-c772bf4a311c" providerId="ADAL" clId="{413746AE-83C4-4944-A8AA-71CCD5B216E9}" dt="2024-02-26T04:55:36.030" v="325"/>
+          <ac:grpSpMkLst>
+            <pc:docMk/>
+            <pc:sldMk cId="2185147656" sldId="671"/>
+            <ac:grpSpMk id="59" creationId="{AD15766C-AC24-71F9-A62E-AF6726FA16A9}"/>
+          </ac:grpSpMkLst>
+        </pc:grpChg>
+        <pc:grpChg chg="del mod">
+          <ac:chgData name="Matthieu De Mari" userId="dfb708c9-d8dc-439f-9a3b-c772bf4a311c" providerId="ADAL" clId="{413746AE-83C4-4944-A8AA-71CCD5B216E9}" dt="2024-02-26T04:55:36.030" v="325"/>
+          <ac:grpSpMkLst>
+            <pc:docMk/>
+            <pc:sldMk cId="2185147656" sldId="671"/>
+            <ac:grpSpMk id="60" creationId="{9ACA3F04-8C82-AF4D-0506-3D8A9511F7B3}"/>
+          </ac:grpSpMkLst>
+        </pc:grpChg>
+        <pc:grpChg chg="del mod">
+          <ac:chgData name="Matthieu De Mari" userId="dfb708c9-d8dc-439f-9a3b-c772bf4a311c" providerId="ADAL" clId="{413746AE-83C4-4944-A8AA-71CCD5B216E9}" dt="2024-02-26T04:55:36.030" v="325"/>
+          <ac:grpSpMkLst>
+            <pc:docMk/>
+            <pc:sldMk cId="2185147656" sldId="671"/>
+            <ac:grpSpMk id="63" creationId="{6BE70022-4852-6210-44E0-5B900B3009A7}"/>
+          </ac:grpSpMkLst>
+        </pc:grpChg>
+        <pc:grpChg chg="del mod">
+          <ac:chgData name="Matthieu De Mari" userId="dfb708c9-d8dc-439f-9a3b-c772bf4a311c" providerId="ADAL" clId="{413746AE-83C4-4944-A8AA-71CCD5B216E9}" dt="2024-02-26T04:55:42.708" v="327"/>
+          <ac:grpSpMkLst>
+            <pc:docMk/>
+            <pc:sldMk cId="2185147656" sldId="671"/>
+            <ac:grpSpMk id="64" creationId="{F82E137F-EF3C-9EE5-D238-6A9D93398A6C}"/>
+          </ac:grpSpMkLst>
+        </pc:grpChg>
+        <pc:grpChg chg="del mod">
+          <ac:chgData name="Matthieu De Mari" userId="dfb708c9-d8dc-439f-9a3b-c772bf4a311c" providerId="ADAL" clId="{413746AE-83C4-4944-A8AA-71CCD5B216E9}" dt="2024-02-26T04:55:44.435" v="329"/>
+          <ac:grpSpMkLst>
+            <pc:docMk/>
+            <pc:sldMk cId="2185147656" sldId="671"/>
+            <ac:grpSpMk id="66" creationId="{45AC8820-6B85-EF7A-25FC-C056D97E9FC4}"/>
+          </ac:grpSpMkLst>
+        </pc:grpChg>
+        <pc:grpChg chg="mod">
+          <ac:chgData name="Matthieu De Mari" userId="dfb708c9-d8dc-439f-9a3b-c772bf4a311c" providerId="ADAL" clId="{413746AE-83C4-4944-A8AA-71CCD5B216E9}" dt="2024-02-26T04:55:44.435" v="329"/>
+          <ac:grpSpMkLst>
+            <pc:docMk/>
+            <pc:sldMk cId="2185147656" sldId="671"/>
+            <ac:grpSpMk id="68" creationId="{865B7B97-2351-B574-9C26-79812A0D566A}"/>
+          </ac:grpSpMkLst>
+        </pc:grpChg>
+        <pc:inkChg chg="add mod">
+          <ac:chgData name="Matthieu De Mari" userId="dfb708c9-d8dc-439f-9a3b-c772bf4a311c" providerId="ADAL" clId="{413746AE-83C4-4944-A8AA-71CCD5B216E9}" dt="2024-02-26T04:54:52.172" v="269"/>
+          <ac:inkMkLst>
+            <pc:docMk/>
+            <pc:sldMk cId="2185147656" sldId="671"/>
+            <ac:inkMk id="4" creationId="{5B339A30-4FF6-5713-A9EB-8C92D2E8340F}"/>
+          </ac:inkMkLst>
+        </pc:inkChg>
+        <pc:inkChg chg="add mod">
+          <ac:chgData name="Matthieu De Mari" userId="dfb708c9-d8dc-439f-9a3b-c772bf4a311c" providerId="ADAL" clId="{413746AE-83C4-4944-A8AA-71CCD5B216E9}" dt="2024-02-26T04:55:42.708" v="327"/>
+          <ac:inkMkLst>
+            <pc:docMk/>
+            <pc:sldMk cId="2185147656" sldId="671"/>
+            <ac:inkMk id="5" creationId="{E7CCEE89-FC80-02E8-80E5-076FBAB27927}"/>
+          </ac:inkMkLst>
+        </pc:inkChg>
+        <pc:inkChg chg="add mod">
+          <ac:chgData name="Matthieu De Mari" userId="dfb708c9-d8dc-439f-9a3b-c772bf4a311c" providerId="ADAL" clId="{413746AE-83C4-4944-A8AA-71CCD5B216E9}" dt="2024-02-26T04:55:42.708" v="327"/>
+          <ac:inkMkLst>
+            <pc:docMk/>
+            <pc:sldMk cId="2185147656" sldId="671"/>
+            <ac:inkMk id="6" creationId="{5C01272A-D5D9-CC6B-E236-CC433CB30DD8}"/>
+          </ac:inkMkLst>
+        </pc:inkChg>
+        <pc:inkChg chg="add mod">
+          <ac:chgData name="Matthieu De Mari" userId="dfb708c9-d8dc-439f-9a3b-c772bf4a311c" providerId="ADAL" clId="{413746AE-83C4-4944-A8AA-71CCD5B216E9}" dt="2024-02-26T04:55:42.708" v="327"/>
+          <ac:inkMkLst>
+            <pc:docMk/>
+            <pc:sldMk cId="2185147656" sldId="671"/>
+            <ac:inkMk id="7" creationId="{494D534A-18A4-21C2-A243-BF8AB26FCC1E}"/>
+          </ac:inkMkLst>
+        </pc:inkChg>
+        <pc:inkChg chg="add mod">
+          <ac:chgData name="Matthieu De Mari" userId="dfb708c9-d8dc-439f-9a3b-c772bf4a311c" providerId="ADAL" clId="{413746AE-83C4-4944-A8AA-71CCD5B216E9}" dt="2024-02-26T04:55:42.708" v="327"/>
+          <ac:inkMkLst>
+            <pc:docMk/>
+            <pc:sldMk cId="2185147656" sldId="671"/>
+            <ac:inkMk id="8" creationId="{67F43482-1F0A-DFC7-DAA5-4EDA9077DBA9}"/>
+          </ac:inkMkLst>
+        </pc:inkChg>
+        <pc:inkChg chg="add mod">
+          <ac:chgData name="Matthieu De Mari" userId="dfb708c9-d8dc-439f-9a3b-c772bf4a311c" providerId="ADAL" clId="{413746AE-83C4-4944-A8AA-71CCD5B216E9}" dt="2024-02-26T04:55:42.708" v="327"/>
+          <ac:inkMkLst>
+            <pc:docMk/>
+            <pc:sldMk cId="2185147656" sldId="671"/>
+            <ac:inkMk id="10" creationId="{55F79BB7-E47B-6A70-5125-D0643AAF682F}"/>
+          </ac:inkMkLst>
+        </pc:inkChg>
+        <pc:inkChg chg="add mod">
+          <ac:chgData name="Matthieu De Mari" userId="dfb708c9-d8dc-439f-9a3b-c772bf4a311c" providerId="ADAL" clId="{413746AE-83C4-4944-A8AA-71CCD5B216E9}" dt="2024-02-26T04:55:42.708" v="327"/>
+          <ac:inkMkLst>
+            <pc:docMk/>
+            <pc:sldMk cId="2185147656" sldId="671"/>
+            <ac:inkMk id="11" creationId="{87339340-0865-8D2A-9524-ACAC1D0885C6}"/>
+          </ac:inkMkLst>
+        </pc:inkChg>
+        <pc:inkChg chg="add mod">
+          <ac:chgData name="Matthieu De Mari" userId="dfb708c9-d8dc-439f-9a3b-c772bf4a311c" providerId="ADAL" clId="{413746AE-83C4-4944-A8AA-71CCD5B216E9}" dt="2024-02-26T04:55:42.708" v="327"/>
+          <ac:inkMkLst>
+            <pc:docMk/>
+            <pc:sldMk cId="2185147656" sldId="671"/>
+            <ac:inkMk id="12" creationId="{F49F6DA7-7F24-3D73-6F54-3855E02E9B4C}"/>
+          </ac:inkMkLst>
+        </pc:inkChg>
+        <pc:inkChg chg="add mod">
+          <ac:chgData name="Matthieu De Mari" userId="dfb708c9-d8dc-439f-9a3b-c772bf4a311c" providerId="ADAL" clId="{413746AE-83C4-4944-A8AA-71CCD5B216E9}" dt="2024-02-26T04:55:42.708" v="327"/>
+          <ac:inkMkLst>
+            <pc:docMk/>
+            <pc:sldMk cId="2185147656" sldId="671"/>
+            <ac:inkMk id="13" creationId="{EBBEC30F-68A5-1C4D-E8DC-D9AFD10375E4}"/>
+          </ac:inkMkLst>
+        </pc:inkChg>
+        <pc:inkChg chg="add mod">
+          <ac:chgData name="Matthieu De Mari" userId="dfb708c9-d8dc-439f-9a3b-c772bf4a311c" providerId="ADAL" clId="{413746AE-83C4-4944-A8AA-71CCD5B216E9}" dt="2024-02-26T04:55:42.708" v="327"/>
+          <ac:inkMkLst>
+            <pc:docMk/>
+            <pc:sldMk cId="2185147656" sldId="671"/>
+            <ac:inkMk id="14" creationId="{55F4BF20-059F-D46A-22C5-47EE4BBEC1EF}"/>
+          </ac:inkMkLst>
+        </pc:inkChg>
+        <pc:inkChg chg="add mod">
+          <ac:chgData name="Matthieu De Mari" userId="dfb708c9-d8dc-439f-9a3b-c772bf4a311c" providerId="ADAL" clId="{413746AE-83C4-4944-A8AA-71CCD5B216E9}" dt="2024-02-26T04:55:42.708" v="327"/>
+          <ac:inkMkLst>
+            <pc:docMk/>
+            <pc:sldMk cId="2185147656" sldId="671"/>
+            <ac:inkMk id="16" creationId="{1D691829-B898-8B56-D422-DCB177021D85}"/>
+          </ac:inkMkLst>
+        </pc:inkChg>
+        <pc:inkChg chg="add mod">
+          <ac:chgData name="Matthieu De Mari" userId="dfb708c9-d8dc-439f-9a3b-c772bf4a311c" providerId="ADAL" clId="{413746AE-83C4-4944-A8AA-71CCD5B216E9}" dt="2024-02-26T04:55:42.708" v="327"/>
+          <ac:inkMkLst>
+            <pc:docMk/>
+            <pc:sldMk cId="2185147656" sldId="671"/>
+            <ac:inkMk id="17" creationId="{B4EC4B6D-1634-F01F-CD62-2751E1FFCFC1}"/>
+          </ac:inkMkLst>
+        </pc:inkChg>
+        <pc:inkChg chg="add mod">
+          <ac:chgData name="Matthieu De Mari" userId="dfb708c9-d8dc-439f-9a3b-c772bf4a311c" providerId="ADAL" clId="{413746AE-83C4-4944-A8AA-71CCD5B216E9}" dt="2024-02-26T04:55:42.708" v="327"/>
+          <ac:inkMkLst>
+            <pc:docMk/>
+            <pc:sldMk cId="2185147656" sldId="671"/>
+            <ac:inkMk id="18" creationId="{DF9895BD-0CFF-B458-2545-C94EE8DA80C9}"/>
+          </ac:inkMkLst>
+        </pc:inkChg>
+        <pc:inkChg chg="add mod">
+          <ac:chgData name="Matthieu De Mari" userId="dfb708c9-d8dc-439f-9a3b-c772bf4a311c" providerId="ADAL" clId="{413746AE-83C4-4944-A8AA-71CCD5B216E9}" dt="2024-02-26T04:55:42.708" v="327"/>
+          <ac:inkMkLst>
+            <pc:docMk/>
+            <pc:sldMk cId="2185147656" sldId="671"/>
+            <ac:inkMk id="19" creationId="{AD91C042-7C25-DDD2-29CE-0A12EA748ED3}"/>
+          </ac:inkMkLst>
+        </pc:inkChg>
+        <pc:inkChg chg="add mod">
+          <ac:chgData name="Matthieu De Mari" userId="dfb708c9-d8dc-439f-9a3b-c772bf4a311c" providerId="ADAL" clId="{413746AE-83C4-4944-A8AA-71CCD5B216E9}" dt="2024-02-26T04:55:44.435" v="329"/>
+          <ac:inkMkLst>
+            <pc:docMk/>
+            <pc:sldMk cId="2185147656" sldId="671"/>
+            <ac:inkMk id="22" creationId="{07D58C60-384D-A492-4E43-8C005FDE46BF}"/>
+          </ac:inkMkLst>
+        </pc:inkChg>
+        <pc:inkChg chg="add mod">
+          <ac:chgData name="Matthieu De Mari" userId="dfb708c9-d8dc-439f-9a3b-c772bf4a311c" providerId="ADAL" clId="{413746AE-83C4-4944-A8AA-71CCD5B216E9}" dt="2024-02-26T04:55:44.435" v="329"/>
+          <ac:inkMkLst>
+            <pc:docMk/>
+            <pc:sldMk cId="2185147656" sldId="671"/>
+            <ac:inkMk id="23" creationId="{BB772CA7-474B-A5DA-696E-612E155B3665}"/>
+          </ac:inkMkLst>
+        </pc:inkChg>
+        <pc:inkChg chg="add mod">
+          <ac:chgData name="Matthieu De Mari" userId="dfb708c9-d8dc-439f-9a3b-c772bf4a311c" providerId="ADAL" clId="{413746AE-83C4-4944-A8AA-71CCD5B216E9}" dt="2024-02-26T04:55:44.435" v="329"/>
+          <ac:inkMkLst>
+            <pc:docMk/>
+            <pc:sldMk cId="2185147656" sldId="671"/>
+            <ac:inkMk id="24" creationId="{2F4D2479-93F3-8B23-9AAC-11EE5E982DDA}"/>
+          </ac:inkMkLst>
+        </pc:inkChg>
+        <pc:inkChg chg="add mod">
+          <ac:chgData name="Matthieu De Mari" userId="dfb708c9-d8dc-439f-9a3b-c772bf4a311c" providerId="ADAL" clId="{413746AE-83C4-4944-A8AA-71CCD5B216E9}" dt="2024-02-26T04:55:44.435" v="329"/>
+          <ac:inkMkLst>
+            <pc:docMk/>
+            <pc:sldMk cId="2185147656" sldId="671"/>
+            <ac:inkMk id="25" creationId="{FBB63E24-7282-6F8B-5FD8-674ADBF90222}"/>
+          </ac:inkMkLst>
+        </pc:inkChg>
+        <pc:inkChg chg="add mod">
+          <ac:chgData name="Matthieu De Mari" userId="dfb708c9-d8dc-439f-9a3b-c772bf4a311c" providerId="ADAL" clId="{413746AE-83C4-4944-A8AA-71CCD5B216E9}" dt="2024-02-26T04:55:44.435" v="329"/>
+          <ac:inkMkLst>
+            <pc:docMk/>
+            <pc:sldMk cId="2185147656" sldId="671"/>
+            <ac:inkMk id="27" creationId="{5E76DAC0-5F97-9E27-047C-FD95C4A6B8E3}"/>
+          </ac:inkMkLst>
+        </pc:inkChg>
+        <pc:inkChg chg="add mod">
+          <ac:chgData name="Matthieu De Mari" userId="dfb708c9-d8dc-439f-9a3b-c772bf4a311c" providerId="ADAL" clId="{413746AE-83C4-4944-A8AA-71CCD5B216E9}" dt="2024-02-26T04:55:44.435" v="329"/>
+          <ac:inkMkLst>
+            <pc:docMk/>
+            <pc:sldMk cId="2185147656" sldId="671"/>
+            <ac:inkMk id="28" creationId="{605645C6-6C9C-4487-D01D-66DE41CDFC2E}"/>
+          </ac:inkMkLst>
+        </pc:inkChg>
+        <pc:inkChg chg="add mod">
+          <ac:chgData name="Matthieu De Mari" userId="dfb708c9-d8dc-439f-9a3b-c772bf4a311c" providerId="ADAL" clId="{413746AE-83C4-4944-A8AA-71CCD5B216E9}" dt="2024-02-26T04:55:44.435" v="329"/>
+          <ac:inkMkLst>
+            <pc:docMk/>
+            <pc:sldMk cId="2185147656" sldId="671"/>
+            <ac:inkMk id="29" creationId="{E998D19E-941F-3427-B03C-FB0B9BC0AA35}"/>
+          </ac:inkMkLst>
+        </pc:inkChg>
+        <pc:inkChg chg="add mod">
+          <ac:chgData name="Matthieu De Mari" userId="dfb708c9-d8dc-439f-9a3b-c772bf4a311c" providerId="ADAL" clId="{413746AE-83C4-4944-A8AA-71CCD5B216E9}" dt="2024-02-26T04:55:44.435" v="329"/>
+          <ac:inkMkLst>
+            <pc:docMk/>
+            <pc:sldMk cId="2185147656" sldId="671"/>
+            <ac:inkMk id="30" creationId="{4C32738C-6DF5-389D-87ED-35D58B6D34C9}"/>
+          </ac:inkMkLst>
+        </pc:inkChg>
+        <pc:inkChg chg="add mod">
+          <ac:chgData name="Matthieu De Mari" userId="dfb708c9-d8dc-439f-9a3b-c772bf4a311c" providerId="ADAL" clId="{413746AE-83C4-4944-A8AA-71CCD5B216E9}" dt="2024-02-26T04:55:44.435" v="329"/>
+          <ac:inkMkLst>
+            <pc:docMk/>
+            <pc:sldMk cId="2185147656" sldId="671"/>
+            <ac:inkMk id="31" creationId="{955D5FFD-1637-2254-3B88-3422BF115C87}"/>
+          </ac:inkMkLst>
+        </pc:inkChg>
+        <pc:inkChg chg="add mod">
+          <ac:chgData name="Matthieu De Mari" userId="dfb708c9-d8dc-439f-9a3b-c772bf4a311c" providerId="ADAL" clId="{413746AE-83C4-4944-A8AA-71CCD5B216E9}" dt="2024-02-26T04:55:44.435" v="329"/>
+          <ac:inkMkLst>
+            <pc:docMk/>
+            <pc:sldMk cId="2185147656" sldId="671"/>
+            <ac:inkMk id="33" creationId="{8AB86296-27B4-9469-89AF-2CEC29FED1CB}"/>
+          </ac:inkMkLst>
+        </pc:inkChg>
+        <pc:inkChg chg="add mod">
+          <ac:chgData name="Matthieu De Mari" userId="dfb708c9-d8dc-439f-9a3b-c772bf4a311c" providerId="ADAL" clId="{413746AE-83C4-4944-A8AA-71CCD5B216E9}" dt="2024-02-26T04:55:44.435" v="329"/>
+          <ac:inkMkLst>
+            <pc:docMk/>
+            <pc:sldMk cId="2185147656" sldId="671"/>
+            <ac:inkMk id="34" creationId="{975605E7-4F97-D9DC-259D-EC9C04508F59}"/>
+          </ac:inkMkLst>
+        </pc:inkChg>
+        <pc:inkChg chg="add mod">
+          <ac:chgData name="Matthieu De Mari" userId="dfb708c9-d8dc-439f-9a3b-c772bf4a311c" providerId="ADAL" clId="{413746AE-83C4-4944-A8AA-71CCD5B216E9}" dt="2024-02-26T04:55:44.435" v="329"/>
+          <ac:inkMkLst>
+            <pc:docMk/>
+            <pc:sldMk cId="2185147656" sldId="671"/>
+            <ac:inkMk id="35" creationId="{5D5CC879-1A2B-FCC9-C4FA-18625E2DCB28}"/>
+          </ac:inkMkLst>
+        </pc:inkChg>
+        <pc:inkChg chg="add mod">
+          <ac:chgData name="Matthieu De Mari" userId="dfb708c9-d8dc-439f-9a3b-c772bf4a311c" providerId="ADAL" clId="{413746AE-83C4-4944-A8AA-71CCD5B216E9}" dt="2024-02-26T04:55:44.435" v="329"/>
+          <ac:inkMkLst>
+            <pc:docMk/>
+            <pc:sldMk cId="2185147656" sldId="671"/>
+            <ac:inkMk id="37" creationId="{4611DBE1-4E8F-4AEF-9879-558D0BE4976B}"/>
+          </ac:inkMkLst>
+        </pc:inkChg>
+        <pc:inkChg chg="add mod">
+          <ac:chgData name="Matthieu De Mari" userId="dfb708c9-d8dc-439f-9a3b-c772bf4a311c" providerId="ADAL" clId="{413746AE-83C4-4944-A8AA-71CCD5B216E9}" dt="2024-02-26T04:55:44.435" v="329"/>
+          <ac:inkMkLst>
+            <pc:docMk/>
+            <pc:sldMk cId="2185147656" sldId="671"/>
+            <ac:inkMk id="38" creationId="{DED30E7B-6526-9E5D-FD09-60799312C037}"/>
+          </ac:inkMkLst>
+        </pc:inkChg>
+        <pc:inkChg chg="add mod">
+          <ac:chgData name="Matthieu De Mari" userId="dfb708c9-d8dc-439f-9a3b-c772bf4a311c" providerId="ADAL" clId="{413746AE-83C4-4944-A8AA-71CCD5B216E9}" dt="2024-02-26T04:55:44.435" v="329"/>
+          <ac:inkMkLst>
+            <pc:docMk/>
+            <pc:sldMk cId="2185147656" sldId="671"/>
+            <ac:inkMk id="39" creationId="{A7F664B6-5719-EB89-DBE3-7DB0C7489467}"/>
+          </ac:inkMkLst>
+        </pc:inkChg>
+        <pc:inkChg chg="add mod">
+          <ac:chgData name="Matthieu De Mari" userId="dfb708c9-d8dc-439f-9a3b-c772bf4a311c" providerId="ADAL" clId="{413746AE-83C4-4944-A8AA-71CCD5B216E9}" dt="2024-02-26T04:55:44.435" v="329"/>
+          <ac:inkMkLst>
+            <pc:docMk/>
+            <pc:sldMk cId="2185147656" sldId="671"/>
+            <ac:inkMk id="40" creationId="{2407D1A6-1C47-A908-889E-9F94F484A5C0}"/>
+          </ac:inkMkLst>
+        </pc:inkChg>
+        <pc:inkChg chg="add mod">
+          <ac:chgData name="Matthieu De Mari" userId="dfb708c9-d8dc-439f-9a3b-c772bf4a311c" providerId="ADAL" clId="{413746AE-83C4-4944-A8AA-71CCD5B216E9}" dt="2024-02-26T04:55:44.435" v="329"/>
+          <ac:inkMkLst>
+            <pc:docMk/>
+            <pc:sldMk cId="2185147656" sldId="671"/>
+            <ac:inkMk id="41" creationId="{C0350451-B18A-0AAE-91EA-87EED96515F0}"/>
+          </ac:inkMkLst>
+        </pc:inkChg>
+        <pc:inkChg chg="add mod">
+          <ac:chgData name="Matthieu De Mari" userId="dfb708c9-d8dc-439f-9a3b-c772bf4a311c" providerId="ADAL" clId="{413746AE-83C4-4944-A8AA-71CCD5B216E9}" dt="2024-02-26T04:55:44.435" v="329"/>
+          <ac:inkMkLst>
+            <pc:docMk/>
+            <pc:sldMk cId="2185147656" sldId="671"/>
+            <ac:inkMk id="42" creationId="{9E1C3471-C8E0-AFFA-37B3-87C701244EF7}"/>
+          </ac:inkMkLst>
+        </pc:inkChg>
+        <pc:inkChg chg="add mod">
+          <ac:chgData name="Matthieu De Mari" userId="dfb708c9-d8dc-439f-9a3b-c772bf4a311c" providerId="ADAL" clId="{413746AE-83C4-4944-A8AA-71CCD5B216E9}" dt="2024-02-26T04:55:44.435" v="329"/>
+          <ac:inkMkLst>
+            <pc:docMk/>
+            <pc:sldMk cId="2185147656" sldId="671"/>
+            <ac:inkMk id="43" creationId="{82332EDA-03AF-8189-0A12-9F31934EAF93}"/>
+          </ac:inkMkLst>
+        </pc:inkChg>
+        <pc:inkChg chg="add mod">
+          <ac:chgData name="Matthieu De Mari" userId="dfb708c9-d8dc-439f-9a3b-c772bf4a311c" providerId="ADAL" clId="{413746AE-83C4-4944-A8AA-71CCD5B216E9}" dt="2024-02-26T04:55:44.435" v="329"/>
+          <ac:inkMkLst>
+            <pc:docMk/>
+            <pc:sldMk cId="2185147656" sldId="671"/>
+            <ac:inkMk id="44" creationId="{9C470ED8-5AC2-1849-507F-CC202B7E8ECD}"/>
+          </ac:inkMkLst>
+        </pc:inkChg>
+        <pc:inkChg chg="add mod">
+          <ac:chgData name="Matthieu De Mari" userId="dfb708c9-d8dc-439f-9a3b-c772bf4a311c" providerId="ADAL" clId="{413746AE-83C4-4944-A8AA-71CCD5B216E9}" dt="2024-02-26T04:55:44.435" v="329"/>
+          <ac:inkMkLst>
+            <pc:docMk/>
+            <pc:sldMk cId="2185147656" sldId="671"/>
+            <ac:inkMk id="47" creationId="{EBC01770-79F8-899B-A2D8-5DD49210D793}"/>
+          </ac:inkMkLst>
+        </pc:inkChg>
+        <pc:inkChg chg="add mod">
+          <ac:chgData name="Matthieu De Mari" userId="dfb708c9-d8dc-439f-9a3b-c772bf4a311c" providerId="ADAL" clId="{413746AE-83C4-4944-A8AA-71CCD5B216E9}" dt="2024-02-26T04:55:44.435" v="329"/>
+          <ac:inkMkLst>
+            <pc:docMk/>
+            <pc:sldMk cId="2185147656" sldId="671"/>
+            <ac:inkMk id="48" creationId="{B9F228B5-52B5-68C1-CE56-D6236442BA2C}"/>
+          </ac:inkMkLst>
+        </pc:inkChg>
+        <pc:inkChg chg="add mod">
+          <ac:chgData name="Matthieu De Mari" userId="dfb708c9-d8dc-439f-9a3b-c772bf4a311c" providerId="ADAL" clId="{413746AE-83C4-4944-A8AA-71CCD5B216E9}" dt="2024-02-26T04:55:44.435" v="329"/>
+          <ac:inkMkLst>
+            <pc:docMk/>
+            <pc:sldMk cId="2185147656" sldId="671"/>
+            <ac:inkMk id="50" creationId="{8C4BDB5F-9379-7814-ADA8-897A208AF39E}"/>
+          </ac:inkMkLst>
+        </pc:inkChg>
+        <pc:inkChg chg="add mod">
+          <ac:chgData name="Matthieu De Mari" userId="dfb708c9-d8dc-439f-9a3b-c772bf4a311c" providerId="ADAL" clId="{413746AE-83C4-4944-A8AA-71CCD5B216E9}" dt="2024-02-26T04:55:44.435" v="329"/>
+          <ac:inkMkLst>
+            <pc:docMk/>
+            <pc:sldMk cId="2185147656" sldId="671"/>
+            <ac:inkMk id="51" creationId="{A2353E32-DF1F-7BED-1FD3-BEF1BB69A806}"/>
+          </ac:inkMkLst>
+        </pc:inkChg>
+        <pc:inkChg chg="add mod">
+          <ac:chgData name="Matthieu De Mari" userId="dfb708c9-d8dc-439f-9a3b-c772bf4a311c" providerId="ADAL" clId="{413746AE-83C4-4944-A8AA-71CCD5B216E9}" dt="2024-02-26T04:55:44.435" v="329"/>
+          <ac:inkMkLst>
+            <pc:docMk/>
+            <pc:sldMk cId="2185147656" sldId="671"/>
+            <ac:inkMk id="52" creationId="{9F7CA51D-1E12-886C-6CE8-F31D83DAC48E}"/>
+          </ac:inkMkLst>
+        </pc:inkChg>
+        <pc:inkChg chg="add mod">
+          <ac:chgData name="Matthieu De Mari" userId="dfb708c9-d8dc-439f-9a3b-c772bf4a311c" providerId="ADAL" clId="{413746AE-83C4-4944-A8AA-71CCD5B216E9}" dt="2024-02-26T04:55:44.435" v="329"/>
+          <ac:inkMkLst>
+            <pc:docMk/>
+            <pc:sldMk cId="2185147656" sldId="671"/>
+            <ac:inkMk id="53" creationId="{F250A51F-68CC-30CE-4DBE-1562D3F2420C}"/>
+          </ac:inkMkLst>
+        </pc:inkChg>
+        <pc:inkChg chg="add mod">
+          <ac:chgData name="Matthieu De Mari" userId="dfb708c9-d8dc-439f-9a3b-c772bf4a311c" providerId="ADAL" clId="{413746AE-83C4-4944-A8AA-71CCD5B216E9}" dt="2024-02-26T04:55:44.435" v="329"/>
+          <ac:inkMkLst>
+            <pc:docMk/>
+            <pc:sldMk cId="2185147656" sldId="671"/>
+            <ac:inkMk id="54" creationId="{913BB73A-E129-D011-7750-0689E3777239}"/>
+          </ac:inkMkLst>
+        </pc:inkChg>
+        <pc:inkChg chg="add mod">
+          <ac:chgData name="Matthieu De Mari" userId="dfb708c9-d8dc-439f-9a3b-c772bf4a311c" providerId="ADAL" clId="{413746AE-83C4-4944-A8AA-71CCD5B216E9}" dt="2024-02-26T04:55:44.435" v="329"/>
+          <ac:inkMkLst>
+            <pc:docMk/>
+            <pc:sldMk cId="2185147656" sldId="671"/>
+            <ac:inkMk id="55" creationId="{2BF35F32-2000-A24E-15A1-1D83EFFEBE53}"/>
+          </ac:inkMkLst>
+        </pc:inkChg>
+        <pc:inkChg chg="add mod">
+          <ac:chgData name="Matthieu De Mari" userId="dfb708c9-d8dc-439f-9a3b-c772bf4a311c" providerId="ADAL" clId="{413746AE-83C4-4944-A8AA-71CCD5B216E9}" dt="2024-02-26T04:55:44.435" v="329"/>
+          <ac:inkMkLst>
+            <pc:docMk/>
+            <pc:sldMk cId="2185147656" sldId="671"/>
+            <ac:inkMk id="56" creationId="{EF8DD05C-6DD9-E6FB-61D1-FD6BFF9B6AC7}"/>
+          </ac:inkMkLst>
+        </pc:inkChg>
+        <pc:inkChg chg="add mod">
+          <ac:chgData name="Matthieu De Mari" userId="dfb708c9-d8dc-439f-9a3b-c772bf4a311c" providerId="ADAL" clId="{413746AE-83C4-4944-A8AA-71CCD5B216E9}" dt="2024-02-26T04:55:44.435" v="329"/>
+          <ac:inkMkLst>
+            <pc:docMk/>
+            <pc:sldMk cId="2185147656" sldId="671"/>
+            <ac:inkMk id="57" creationId="{D576C309-0083-B141-2FB8-67C910E6CC11}"/>
+          </ac:inkMkLst>
+        </pc:inkChg>
+        <pc:inkChg chg="add mod">
+          <ac:chgData name="Matthieu De Mari" userId="dfb708c9-d8dc-439f-9a3b-c772bf4a311c" providerId="ADAL" clId="{413746AE-83C4-4944-A8AA-71CCD5B216E9}" dt="2024-02-26T04:55:44.435" v="329"/>
+          <ac:inkMkLst>
+            <pc:docMk/>
+            <pc:sldMk cId="2185147656" sldId="671"/>
+            <ac:inkMk id="58" creationId="{5901264F-90B2-CBC4-4EE8-0B53320B96EE}"/>
+          </ac:inkMkLst>
+        </pc:inkChg>
+        <pc:inkChg chg="add mod">
+          <ac:chgData name="Matthieu De Mari" userId="dfb708c9-d8dc-439f-9a3b-c772bf4a311c" providerId="ADAL" clId="{413746AE-83C4-4944-A8AA-71CCD5B216E9}" dt="2024-02-26T04:55:42.708" v="327"/>
+          <ac:inkMkLst>
+            <pc:docMk/>
+            <pc:sldMk cId="2185147656" sldId="671"/>
+            <ac:inkMk id="61" creationId="{97464F29-C6B1-C053-6D7E-B22BB9151188}"/>
+          </ac:inkMkLst>
+        </pc:inkChg>
+        <pc:inkChg chg="add mod">
+          <ac:chgData name="Matthieu De Mari" userId="dfb708c9-d8dc-439f-9a3b-c772bf4a311c" providerId="ADAL" clId="{413746AE-83C4-4944-A8AA-71CCD5B216E9}" dt="2024-02-26T04:55:42.708" v="327"/>
+          <ac:inkMkLst>
+            <pc:docMk/>
+            <pc:sldMk cId="2185147656" sldId="671"/>
+            <ac:inkMk id="62" creationId="{8BE62C72-F6DE-5079-7296-8FE9D6F4449F}"/>
+          </ac:inkMkLst>
+        </pc:inkChg>
+        <pc:inkChg chg="add mod">
+          <ac:chgData name="Matthieu De Mari" userId="dfb708c9-d8dc-439f-9a3b-c772bf4a311c" providerId="ADAL" clId="{413746AE-83C4-4944-A8AA-71CCD5B216E9}" dt="2024-02-26T04:55:44.435" v="329"/>
+          <ac:inkMkLst>
+            <pc:docMk/>
+            <pc:sldMk cId="2185147656" sldId="671"/>
+            <ac:inkMk id="65" creationId="{1AC5973A-6963-AC3C-A06D-C6514A6862F3}"/>
+          </ac:inkMkLst>
+        </pc:inkChg>
+        <pc:inkChg chg="add mod">
+          <ac:chgData name="Matthieu De Mari" userId="dfb708c9-d8dc-439f-9a3b-c772bf4a311c" providerId="ADAL" clId="{413746AE-83C4-4944-A8AA-71CCD5B216E9}" dt="2024-02-26T04:55:44.435" v="329"/>
+          <ac:inkMkLst>
+            <pc:docMk/>
+            <pc:sldMk cId="2185147656" sldId="671"/>
+            <ac:inkMk id="67" creationId="{1FEC42E9-2107-2CD1-5E2D-3A74AEF0A417}"/>
+          </ac:inkMkLst>
+        </pc:inkChg>
       </pc:sldChg>
     </pc:docChg>
   </pc:docChgLst>
@@ -7387,7 +8017,7 @@
           <a:p>
             <a:fld id="{61478373-EB31-4867-8CF0-FA31364748A5}" type="datetimeFigureOut">
               <a:rPr lang="en-GB" smtClean="0"/>
-              <a:t>09/02/2024</a:t>
+              <a:t>26/02/2024</a:t>
             </a:fld>
             <a:endParaRPr lang="en-GB"/>
           </a:p>
@@ -7804,7 +8434,7 @@
           <a:p>
             <a:fld id="{E85DF616-B21E-4EF6-A6A5-95E2FB3EB1A1}" type="datetimeFigureOut">
               <a:rPr lang="en-GB" smtClean="0"/>
-              <a:t>09/02/2024</a:t>
+              <a:t>26/02/2024</a:t>
             </a:fld>
             <a:endParaRPr lang="en-GB"/>
           </a:p>
@@ -8004,7 +8634,7 @@
           <a:p>
             <a:fld id="{E85DF616-B21E-4EF6-A6A5-95E2FB3EB1A1}" type="datetimeFigureOut">
               <a:rPr lang="en-GB" smtClean="0"/>
-              <a:t>09/02/2024</a:t>
+              <a:t>26/02/2024</a:t>
             </a:fld>
             <a:endParaRPr lang="en-GB"/>
           </a:p>
@@ -8214,7 +8844,7 @@
           <a:p>
             <a:fld id="{E85DF616-B21E-4EF6-A6A5-95E2FB3EB1A1}" type="datetimeFigureOut">
               <a:rPr lang="en-GB" smtClean="0"/>
-              <a:t>09/02/2024</a:t>
+              <a:t>26/02/2024</a:t>
             </a:fld>
             <a:endParaRPr lang="en-GB"/>
           </a:p>
@@ -8414,7 +9044,7 @@
           <a:p>
             <a:fld id="{E85DF616-B21E-4EF6-A6A5-95E2FB3EB1A1}" type="datetimeFigureOut">
               <a:rPr lang="en-GB" smtClean="0"/>
-              <a:t>09/02/2024</a:t>
+              <a:t>26/02/2024</a:t>
             </a:fld>
             <a:endParaRPr lang="en-GB"/>
           </a:p>
@@ -8690,7 +9320,7 @@
           <a:p>
             <a:fld id="{E85DF616-B21E-4EF6-A6A5-95E2FB3EB1A1}" type="datetimeFigureOut">
               <a:rPr lang="en-GB" smtClean="0"/>
-              <a:t>09/02/2024</a:t>
+              <a:t>26/02/2024</a:t>
             </a:fld>
             <a:endParaRPr lang="en-GB"/>
           </a:p>
@@ -8958,7 +9588,7 @@
           <a:p>
             <a:fld id="{E85DF616-B21E-4EF6-A6A5-95E2FB3EB1A1}" type="datetimeFigureOut">
               <a:rPr lang="en-GB" smtClean="0"/>
-              <a:t>09/02/2024</a:t>
+              <a:t>26/02/2024</a:t>
             </a:fld>
             <a:endParaRPr lang="en-GB"/>
           </a:p>
@@ -9373,7 +10003,7 @@
           <a:p>
             <a:fld id="{E85DF616-B21E-4EF6-A6A5-95E2FB3EB1A1}" type="datetimeFigureOut">
               <a:rPr lang="en-GB" smtClean="0"/>
-              <a:t>09/02/2024</a:t>
+              <a:t>26/02/2024</a:t>
             </a:fld>
             <a:endParaRPr lang="en-GB"/>
           </a:p>
@@ -9515,7 +10145,7 @@
           <a:p>
             <a:fld id="{E85DF616-B21E-4EF6-A6A5-95E2FB3EB1A1}" type="datetimeFigureOut">
               <a:rPr lang="en-GB" smtClean="0"/>
-              <a:t>09/02/2024</a:t>
+              <a:t>26/02/2024</a:t>
             </a:fld>
             <a:endParaRPr lang="en-GB"/>
           </a:p>
@@ -9628,7 +10258,7 @@
           <a:p>
             <a:fld id="{E85DF616-B21E-4EF6-A6A5-95E2FB3EB1A1}" type="datetimeFigureOut">
               <a:rPr lang="en-GB" smtClean="0"/>
-              <a:t>09/02/2024</a:t>
+              <a:t>26/02/2024</a:t>
             </a:fld>
             <a:endParaRPr lang="en-GB"/>
           </a:p>
@@ -9941,7 +10571,7 @@
           <a:p>
             <a:fld id="{E85DF616-B21E-4EF6-A6A5-95E2FB3EB1A1}" type="datetimeFigureOut">
               <a:rPr lang="en-GB" smtClean="0"/>
-              <a:t>09/02/2024</a:t>
+              <a:t>26/02/2024</a:t>
             </a:fld>
             <a:endParaRPr lang="en-GB"/>
           </a:p>
@@ -10230,7 +10860,7 @@
           <a:p>
             <a:fld id="{E85DF616-B21E-4EF6-A6A5-95E2FB3EB1A1}" type="datetimeFigureOut">
               <a:rPr lang="en-GB" smtClean="0"/>
-              <a:t>09/02/2024</a:t>
+              <a:t>26/02/2024</a:t>
             </a:fld>
             <a:endParaRPr lang="en-GB"/>
           </a:p>
@@ -10473,7 +11103,7 @@
           <a:p>
             <a:fld id="{E85DF616-B21E-4EF6-A6A5-95E2FB3EB1A1}" type="datetimeFigureOut">
               <a:rPr lang="en-GB" smtClean="0"/>
-              <a:t>09/02/2024</a:t>
+              <a:t>26/02/2024</a:t>
             </a:fld>
             <a:endParaRPr lang="en-GB"/>
           </a:p>
@@ -31328,8 +31958,8 @@
           </a:p>
         </p:txBody>
       </p:sp>
-      <mc:AlternateContent xmlns:mc="http://schemas.openxmlformats.org/markup-compatibility/2006">
-        <mc:Choice xmlns:a14="http://schemas.microsoft.com/office/drawing/2010/main" Requires="a14">
+      <mc:AlternateContent xmlns:mc="http://schemas.openxmlformats.org/markup-compatibility/2006" xmlns:a14="http://schemas.microsoft.com/office/drawing/2010/main">
+        <mc:Choice Requires="a14">
           <p:sp>
             <p:nvSpPr>
               <p:cNvPr id="3" name="Content Placeholder 2">
@@ -31520,7 +32150,7 @@
             </p:txBody>
           </p:sp>
         </mc:Choice>
-        <mc:Fallback>
+        <mc:Fallback xmlns="">
           <p:sp>
             <p:nvSpPr>
               <p:cNvPr id="3" name="Content Placeholder 2">
@@ -32570,8 +33200,8 @@
           </a:p>
         </p:txBody>
       </p:sp>
-      <mc:AlternateContent xmlns:mc="http://schemas.openxmlformats.org/markup-compatibility/2006">
-        <mc:Choice xmlns:a14="http://schemas.microsoft.com/office/drawing/2010/main" Requires="a14">
+      <mc:AlternateContent xmlns:mc="http://schemas.openxmlformats.org/markup-compatibility/2006" xmlns:a14="http://schemas.microsoft.com/office/drawing/2010/main">
+        <mc:Choice Requires="a14">
           <p:sp>
             <p:nvSpPr>
               <p:cNvPr id="3" name="Content Placeholder 2">
@@ -32777,7 +33407,7 @@
             </p:txBody>
           </p:sp>
         </mc:Choice>
-        <mc:Fallback>
+        <mc:Fallback xmlns="">
           <p:sp>
             <p:nvSpPr>
               <p:cNvPr id="3" name="Content Placeholder 2">

</xml_diff>